<commit_message>
Angefangen REFs zu implementieren.
</commit_message>
<xml_diff>
--- a/vrp-lib/src/test/Beispiel.pptx
+++ b/vrp-lib/src/test/Beispiel.pptx
@@ -3964,7 +3964,7 @@
         <p:spPr>
           <a:xfrm>
             <a:off x="6300192" y="764704"/>
-            <a:ext cx="1584088" cy="2031325"/>
+            <a:ext cx="1815433" cy="2585323"/>
           </a:xfrm>
           <a:prstGeom prst="rect">
             <a:avLst/>
@@ -4024,6 +4024,15 @@
             <a:r>
               <a:rPr lang="de-DE" dirty="0" smtClean="0"/>
               <a:t>t(3,D) = 51,478</a:t>
+            </a:r>
+          </a:p>
+          <a:p>
+            <a:endParaRPr lang="de-DE" dirty="0"/>
+          </a:p>
+          <a:p>
+            <a:r>
+              <a:rPr lang="de-DE" dirty="0" smtClean="0"/>
+              <a:t>Service Times: 90</a:t>
             </a:r>
             <a:endParaRPr lang="de-DE" dirty="0"/>
           </a:p>

</xml_diff>

<commit_message>
Auf dem REFs ans Laufen zu bekommen. Es entstehen leider noch zeitfensterunzulässige Lösungen.
</commit_message>
<xml_diff>
--- a/vrp-lib/src/test/Beispiel.pptx
+++ b/vrp-lib/src/test/Beispiel.pptx
@@ -7,6 +7,7 @@
   <p:sldIdLst>
     <p:sldId id="256" r:id="rId2"/>
     <p:sldId id="257" r:id="rId3"/>
+    <p:sldId id="258" r:id="rId4"/>
   </p:sldIdLst>
   <p:sldSz cx="9144000" cy="6858000" type="screen4x3"/>
   <p:notesSz cx="6797675" cy="9926638"/>
@@ -105,6 +106,22 @@
       </a:defRPr>
     </a:lvl9pPr>
   </p:defaultTextStyle>
+  <p:extLst>
+    <p:ext uri="{EFAFB233-063F-42B5-8137-9DF3F51BA10A}">
+      <p15:sldGuideLst xmlns:p15="http://schemas.microsoft.com/office/powerpoint/2012/main">
+        <p15:guide id="1" orient="horz" pos="2160">
+          <p15:clr>
+            <a:srgbClr val="A4A3A4"/>
+          </p15:clr>
+        </p15:guide>
+        <p15:guide id="2" pos="2880">
+          <p15:clr>
+            <a:srgbClr val="A4A3A4"/>
+          </p15:clr>
+        </p15:guide>
+      </p15:sldGuideLst>
+    </p:ext>
+  </p:extLst>
 </p:presentation>
 </file>
 
@@ -289,7 +306,7 @@
           <a:p>
             <a:fld id="{D829C7CD-3386-40FA-8BB3-5D88311FF09B}" type="datetimeFigureOut">
               <a:rPr lang="de-DE" smtClean="0"/>
-              <a:t>27.01.2015</a:t>
+              <a:t>19.02.2015</a:t>
             </a:fld>
             <a:endParaRPr lang="de-DE"/>
           </a:p>
@@ -331,7 +348,7 @@
           <a:p>
             <a:fld id="{F76C91C4-4D1A-486B-9C6B-8D0BAFD96C0A}" type="slidenum">
               <a:rPr lang="de-DE" smtClean="0"/>
-              <a:t>‹Nr.›</a:t>
+              <a:t>‹#›</a:t>
             </a:fld>
             <a:endParaRPr lang="de-DE"/>
           </a:p>
@@ -459,7 +476,7 @@
           <a:p>
             <a:fld id="{D829C7CD-3386-40FA-8BB3-5D88311FF09B}" type="datetimeFigureOut">
               <a:rPr lang="de-DE" smtClean="0"/>
-              <a:t>27.01.2015</a:t>
+              <a:t>19.02.2015</a:t>
             </a:fld>
             <a:endParaRPr lang="de-DE"/>
           </a:p>
@@ -501,7 +518,7 @@
           <a:p>
             <a:fld id="{F76C91C4-4D1A-486B-9C6B-8D0BAFD96C0A}" type="slidenum">
               <a:rPr lang="de-DE" smtClean="0"/>
-              <a:t>‹Nr.›</a:t>
+              <a:t>‹#›</a:t>
             </a:fld>
             <a:endParaRPr lang="de-DE"/>
           </a:p>
@@ -639,7 +656,7 @@
           <a:p>
             <a:fld id="{D829C7CD-3386-40FA-8BB3-5D88311FF09B}" type="datetimeFigureOut">
               <a:rPr lang="de-DE" smtClean="0"/>
-              <a:t>27.01.2015</a:t>
+              <a:t>19.02.2015</a:t>
             </a:fld>
             <a:endParaRPr lang="de-DE"/>
           </a:p>
@@ -681,7 +698,7 @@
           <a:p>
             <a:fld id="{F76C91C4-4D1A-486B-9C6B-8D0BAFD96C0A}" type="slidenum">
               <a:rPr lang="de-DE" smtClean="0"/>
-              <a:t>‹Nr.›</a:t>
+              <a:t>‹#›</a:t>
             </a:fld>
             <a:endParaRPr lang="de-DE"/>
           </a:p>
@@ -809,7 +826,7 @@
           <a:p>
             <a:fld id="{D829C7CD-3386-40FA-8BB3-5D88311FF09B}" type="datetimeFigureOut">
               <a:rPr lang="de-DE" smtClean="0"/>
-              <a:t>27.01.2015</a:t>
+              <a:t>19.02.2015</a:t>
             </a:fld>
             <a:endParaRPr lang="de-DE"/>
           </a:p>
@@ -851,7 +868,7 @@
           <a:p>
             <a:fld id="{F76C91C4-4D1A-486B-9C6B-8D0BAFD96C0A}" type="slidenum">
               <a:rPr lang="de-DE" smtClean="0"/>
-              <a:t>‹Nr.›</a:t>
+              <a:t>‹#›</a:t>
             </a:fld>
             <a:endParaRPr lang="de-DE"/>
           </a:p>
@@ -1055,7 +1072,7 @@
           <a:p>
             <a:fld id="{D829C7CD-3386-40FA-8BB3-5D88311FF09B}" type="datetimeFigureOut">
               <a:rPr lang="de-DE" smtClean="0"/>
-              <a:t>27.01.2015</a:t>
+              <a:t>19.02.2015</a:t>
             </a:fld>
             <a:endParaRPr lang="de-DE"/>
           </a:p>
@@ -1097,7 +1114,7 @@
           <a:p>
             <a:fld id="{F76C91C4-4D1A-486B-9C6B-8D0BAFD96C0A}" type="slidenum">
               <a:rPr lang="de-DE" smtClean="0"/>
-              <a:t>‹Nr.›</a:t>
+              <a:t>‹#›</a:t>
             </a:fld>
             <a:endParaRPr lang="de-DE"/>
           </a:p>
@@ -1343,7 +1360,7 @@
           <a:p>
             <a:fld id="{D829C7CD-3386-40FA-8BB3-5D88311FF09B}" type="datetimeFigureOut">
               <a:rPr lang="de-DE" smtClean="0"/>
-              <a:t>27.01.2015</a:t>
+              <a:t>19.02.2015</a:t>
             </a:fld>
             <a:endParaRPr lang="de-DE"/>
           </a:p>
@@ -1385,7 +1402,7 @@
           <a:p>
             <a:fld id="{F76C91C4-4D1A-486B-9C6B-8D0BAFD96C0A}" type="slidenum">
               <a:rPr lang="de-DE" smtClean="0"/>
-              <a:t>‹Nr.›</a:t>
+              <a:t>‹#›</a:t>
             </a:fld>
             <a:endParaRPr lang="de-DE"/>
           </a:p>
@@ -1765,7 +1782,7 @@
           <a:p>
             <a:fld id="{D829C7CD-3386-40FA-8BB3-5D88311FF09B}" type="datetimeFigureOut">
               <a:rPr lang="de-DE" smtClean="0"/>
-              <a:t>27.01.2015</a:t>
+              <a:t>19.02.2015</a:t>
             </a:fld>
             <a:endParaRPr lang="de-DE"/>
           </a:p>
@@ -1807,7 +1824,7 @@
           <a:p>
             <a:fld id="{F76C91C4-4D1A-486B-9C6B-8D0BAFD96C0A}" type="slidenum">
               <a:rPr lang="de-DE" smtClean="0"/>
-              <a:t>‹Nr.›</a:t>
+              <a:t>‹#›</a:t>
             </a:fld>
             <a:endParaRPr lang="de-DE"/>
           </a:p>
@@ -1883,7 +1900,7 @@
           <a:p>
             <a:fld id="{D829C7CD-3386-40FA-8BB3-5D88311FF09B}" type="datetimeFigureOut">
               <a:rPr lang="de-DE" smtClean="0"/>
-              <a:t>27.01.2015</a:t>
+              <a:t>19.02.2015</a:t>
             </a:fld>
             <a:endParaRPr lang="de-DE"/>
           </a:p>
@@ -1925,7 +1942,7 @@
           <a:p>
             <a:fld id="{F76C91C4-4D1A-486B-9C6B-8D0BAFD96C0A}" type="slidenum">
               <a:rPr lang="de-DE" smtClean="0"/>
-              <a:t>‹Nr.›</a:t>
+              <a:t>‹#›</a:t>
             </a:fld>
             <a:endParaRPr lang="de-DE"/>
           </a:p>
@@ -1978,7 +1995,7 @@
           <a:p>
             <a:fld id="{D829C7CD-3386-40FA-8BB3-5D88311FF09B}" type="datetimeFigureOut">
               <a:rPr lang="de-DE" smtClean="0"/>
-              <a:t>27.01.2015</a:t>
+              <a:t>19.02.2015</a:t>
             </a:fld>
             <a:endParaRPr lang="de-DE"/>
           </a:p>
@@ -2020,7 +2037,7 @@
           <a:p>
             <a:fld id="{F76C91C4-4D1A-486B-9C6B-8D0BAFD96C0A}" type="slidenum">
               <a:rPr lang="de-DE" smtClean="0"/>
-              <a:t>‹Nr.›</a:t>
+              <a:t>‹#›</a:t>
             </a:fld>
             <a:endParaRPr lang="de-DE"/>
           </a:p>
@@ -2255,7 +2272,7 @@
           <a:p>
             <a:fld id="{D829C7CD-3386-40FA-8BB3-5D88311FF09B}" type="datetimeFigureOut">
               <a:rPr lang="de-DE" smtClean="0"/>
-              <a:t>27.01.2015</a:t>
+              <a:t>19.02.2015</a:t>
             </a:fld>
             <a:endParaRPr lang="de-DE"/>
           </a:p>
@@ -2297,7 +2314,7 @@
           <a:p>
             <a:fld id="{F76C91C4-4D1A-486B-9C6B-8D0BAFD96C0A}" type="slidenum">
               <a:rPr lang="de-DE" smtClean="0"/>
-              <a:t>‹Nr.›</a:t>
+              <a:t>‹#›</a:t>
             </a:fld>
             <a:endParaRPr lang="de-DE"/>
           </a:p>
@@ -2508,7 +2525,7 @@
           <a:p>
             <a:fld id="{D829C7CD-3386-40FA-8BB3-5D88311FF09B}" type="datetimeFigureOut">
               <a:rPr lang="de-DE" smtClean="0"/>
-              <a:t>27.01.2015</a:t>
+              <a:t>19.02.2015</a:t>
             </a:fld>
             <a:endParaRPr lang="de-DE"/>
           </a:p>
@@ -2550,7 +2567,7 @@
           <a:p>
             <a:fld id="{F76C91C4-4D1A-486B-9C6B-8D0BAFD96C0A}" type="slidenum">
               <a:rPr lang="de-DE" smtClean="0"/>
-              <a:t>‹Nr.›</a:t>
+              <a:t>‹#›</a:t>
             </a:fld>
             <a:endParaRPr lang="de-DE"/>
           </a:p>
@@ -2721,7 +2738,7 @@
           <a:p>
             <a:fld id="{D829C7CD-3386-40FA-8BB3-5D88311FF09B}" type="datetimeFigureOut">
               <a:rPr lang="de-DE" smtClean="0"/>
-              <a:t>27.01.2015</a:t>
+              <a:t>19.02.2015</a:t>
             </a:fld>
             <a:endParaRPr lang="de-DE"/>
           </a:p>
@@ -2799,7 +2816,7 @@
           <a:p>
             <a:fld id="{F76C91C4-4D1A-486B-9C6B-8D0BAFD96C0A}" type="slidenum">
               <a:rPr lang="de-DE" smtClean="0"/>
-              <a:t>‹Nr.›</a:t>
+              <a:t>‹#›</a:t>
             </a:fld>
             <a:endParaRPr lang="de-DE"/>
           </a:p>
@@ -3144,6 +3161,13 @@
   <p:clrMapOvr>
     <a:masterClrMapping/>
   </p:clrMapOvr>
+  <p:timing>
+    <p:tnLst>
+      <p:par>
+        <p:cTn id="1" dur="indefinite" restart="never" nodeType="tmRoot"/>
+      </p:par>
+    </p:tnLst>
+  </p:timing>
 </p:sld>
 </file>
 
@@ -4048,6 +4072,1285 @@
   <p:clrMapOvr>
     <a:masterClrMapping/>
   </p:clrMapOvr>
+  <p:timing>
+    <p:tnLst>
+      <p:par>
+        <p:cTn id="1" dur="indefinite" restart="never" nodeType="tmRoot"/>
+      </p:par>
+    </p:tnLst>
+  </p:timing>
+</p:sld>
+</file>
+
+<file path=ppt/slides/slide3.xml><?xml version="1.0" encoding="utf-8"?>
+<p:sld xmlns:a="http://schemas.openxmlformats.org/drawingml/2006/main" xmlns:r="http://schemas.openxmlformats.org/officeDocument/2006/relationships" xmlns:p="http://schemas.openxmlformats.org/presentationml/2006/main">
+  <p:cSld>
+    <p:spTree>
+      <p:nvGrpSpPr>
+        <p:cNvPr id="1" name=""/>
+        <p:cNvGrpSpPr/>
+        <p:nvPr/>
+      </p:nvGrpSpPr>
+      <p:grpSpPr>
+        <a:xfrm>
+          <a:off x="0" y="0"/>
+          <a:ext cx="0" cy="0"/>
+          <a:chOff x="0" y="0"/>
+          <a:chExt cx="0" cy="0"/>
+        </a:xfrm>
+      </p:grpSpPr>
+      <p:cxnSp>
+        <p:nvCxnSpPr>
+          <p:cNvPr id="5" name="Gerade Verbindung mit Pfeil 4"/>
+          <p:cNvCxnSpPr/>
+          <p:nvPr/>
+        </p:nvCxnSpPr>
+        <p:spPr>
+          <a:xfrm flipV="1">
+            <a:off x="971600" y="548680"/>
+            <a:ext cx="0" cy="5760640"/>
+          </a:xfrm>
+          <a:prstGeom prst="straightConnector1">
+            <a:avLst/>
+          </a:prstGeom>
+          <a:ln>
+            <a:tailEnd type="arrow"/>
+          </a:ln>
+        </p:spPr>
+        <p:style>
+          <a:lnRef idx="1">
+            <a:schemeClr val="accent1"/>
+          </a:lnRef>
+          <a:fillRef idx="0">
+            <a:schemeClr val="accent1"/>
+          </a:fillRef>
+          <a:effectRef idx="0">
+            <a:schemeClr val="accent1"/>
+          </a:effectRef>
+          <a:fontRef idx="minor">
+            <a:schemeClr val="tx1"/>
+          </a:fontRef>
+        </p:style>
+      </p:cxnSp>
+      <p:cxnSp>
+        <p:nvCxnSpPr>
+          <p:cNvPr id="7" name="Gerade Verbindung mit Pfeil 6"/>
+          <p:cNvCxnSpPr/>
+          <p:nvPr/>
+        </p:nvCxnSpPr>
+        <p:spPr>
+          <a:xfrm>
+            <a:off x="971600" y="6309320"/>
+            <a:ext cx="7200800" cy="0"/>
+          </a:xfrm>
+          <a:prstGeom prst="straightConnector1">
+            <a:avLst/>
+          </a:prstGeom>
+          <a:ln>
+            <a:tailEnd type="arrow"/>
+          </a:ln>
+        </p:spPr>
+        <p:style>
+          <a:lnRef idx="1">
+            <a:schemeClr val="accent1"/>
+          </a:lnRef>
+          <a:fillRef idx="0">
+            <a:schemeClr val="accent1"/>
+          </a:fillRef>
+          <a:effectRef idx="0">
+            <a:schemeClr val="accent1"/>
+          </a:effectRef>
+          <a:fontRef idx="minor">
+            <a:schemeClr val="tx1"/>
+          </a:fontRef>
+        </p:style>
+      </p:cxnSp>
+      <p:sp>
+        <p:nvSpPr>
+          <p:cNvPr id="8" name="Textfeld 7"/>
+          <p:cNvSpPr txBox="1"/>
+          <p:nvPr/>
+        </p:nvSpPr>
+        <p:spPr>
+          <a:xfrm>
+            <a:off x="474975" y="5445224"/>
+            <a:ext cx="341760" cy="276999"/>
+          </a:xfrm>
+          <a:prstGeom prst="rect">
+            <a:avLst/>
+          </a:prstGeom>
+          <a:noFill/>
+        </p:spPr>
+        <p:txBody>
+          <a:bodyPr wrap="none" rtlCol="0">
+            <a:spAutoFit/>
+          </a:bodyPr>
+          <a:lstStyle/>
+          <a:p>
+            <a:r>
+              <a:rPr lang="de-DE" sz="1200" dirty="0" smtClean="0"/>
+              <a:t>30</a:t>
+            </a:r>
+            <a:endParaRPr lang="de-DE" sz="1200" dirty="0"/>
+          </a:p>
+        </p:txBody>
+      </p:sp>
+      <p:sp>
+        <p:nvSpPr>
+          <p:cNvPr id="9" name="Textfeld 8"/>
+          <p:cNvSpPr txBox="1"/>
+          <p:nvPr/>
+        </p:nvSpPr>
+        <p:spPr>
+          <a:xfrm>
+            <a:off x="467544" y="4725144"/>
+            <a:ext cx="341760" cy="276999"/>
+          </a:xfrm>
+          <a:prstGeom prst="rect">
+            <a:avLst/>
+          </a:prstGeom>
+          <a:noFill/>
+        </p:spPr>
+        <p:txBody>
+          <a:bodyPr wrap="none" rtlCol="0">
+            <a:spAutoFit/>
+          </a:bodyPr>
+          <a:lstStyle/>
+          <a:p>
+            <a:r>
+              <a:rPr lang="de-DE" sz="1200" dirty="0" smtClean="0"/>
+              <a:t>40</a:t>
+            </a:r>
+            <a:endParaRPr lang="de-DE" sz="1200" dirty="0"/>
+          </a:p>
+        </p:txBody>
+      </p:sp>
+      <p:sp>
+        <p:nvSpPr>
+          <p:cNvPr id="10" name="Textfeld 9"/>
+          <p:cNvSpPr txBox="1"/>
+          <p:nvPr/>
+        </p:nvSpPr>
+        <p:spPr>
+          <a:xfrm>
+            <a:off x="467544" y="4005064"/>
+            <a:ext cx="341760" cy="276999"/>
+          </a:xfrm>
+          <a:prstGeom prst="rect">
+            <a:avLst/>
+          </a:prstGeom>
+          <a:noFill/>
+        </p:spPr>
+        <p:txBody>
+          <a:bodyPr wrap="none" rtlCol="0">
+            <a:spAutoFit/>
+          </a:bodyPr>
+          <a:lstStyle/>
+          <a:p>
+            <a:r>
+              <a:rPr lang="de-DE" sz="1200" dirty="0" smtClean="0"/>
+              <a:t>50</a:t>
+            </a:r>
+            <a:endParaRPr lang="de-DE" sz="1200" dirty="0"/>
+          </a:p>
+        </p:txBody>
+      </p:sp>
+      <p:sp>
+        <p:nvSpPr>
+          <p:cNvPr id="11" name="Textfeld 10"/>
+          <p:cNvSpPr txBox="1"/>
+          <p:nvPr/>
+        </p:nvSpPr>
+        <p:spPr>
+          <a:xfrm>
+            <a:off x="467544" y="3284984"/>
+            <a:ext cx="341760" cy="276999"/>
+          </a:xfrm>
+          <a:prstGeom prst="rect">
+            <a:avLst/>
+          </a:prstGeom>
+          <a:noFill/>
+        </p:spPr>
+        <p:txBody>
+          <a:bodyPr wrap="none" rtlCol="0">
+            <a:spAutoFit/>
+          </a:bodyPr>
+          <a:lstStyle/>
+          <a:p>
+            <a:r>
+              <a:rPr lang="de-DE" sz="1200" dirty="0" smtClean="0"/>
+              <a:t>60</a:t>
+            </a:r>
+            <a:endParaRPr lang="de-DE" sz="1200" dirty="0"/>
+          </a:p>
+        </p:txBody>
+      </p:sp>
+      <p:sp>
+        <p:nvSpPr>
+          <p:cNvPr id="12" name="Textfeld 11"/>
+          <p:cNvSpPr txBox="1"/>
+          <p:nvPr/>
+        </p:nvSpPr>
+        <p:spPr>
+          <a:xfrm>
+            <a:off x="467544" y="2564904"/>
+            <a:ext cx="341760" cy="276999"/>
+          </a:xfrm>
+          <a:prstGeom prst="rect">
+            <a:avLst/>
+          </a:prstGeom>
+          <a:noFill/>
+        </p:spPr>
+        <p:txBody>
+          <a:bodyPr wrap="none" rtlCol="0">
+            <a:spAutoFit/>
+          </a:bodyPr>
+          <a:lstStyle/>
+          <a:p>
+            <a:r>
+              <a:rPr lang="de-DE" sz="1200" dirty="0" smtClean="0"/>
+              <a:t>70</a:t>
+            </a:r>
+            <a:endParaRPr lang="de-DE" sz="1200" dirty="0"/>
+          </a:p>
+        </p:txBody>
+      </p:sp>
+      <p:sp>
+        <p:nvSpPr>
+          <p:cNvPr id="13" name="Textfeld 12"/>
+          <p:cNvSpPr txBox="1"/>
+          <p:nvPr/>
+        </p:nvSpPr>
+        <p:spPr>
+          <a:xfrm>
+            <a:off x="467544" y="1844824"/>
+            <a:ext cx="341760" cy="276999"/>
+          </a:xfrm>
+          <a:prstGeom prst="rect">
+            <a:avLst/>
+          </a:prstGeom>
+          <a:noFill/>
+        </p:spPr>
+        <p:txBody>
+          <a:bodyPr wrap="none" rtlCol="0">
+            <a:spAutoFit/>
+          </a:bodyPr>
+          <a:lstStyle/>
+          <a:p>
+            <a:r>
+              <a:rPr lang="de-DE" sz="1200" dirty="0" smtClean="0"/>
+              <a:t>80</a:t>
+            </a:r>
+            <a:endParaRPr lang="de-DE" sz="1200" dirty="0"/>
+          </a:p>
+        </p:txBody>
+      </p:sp>
+      <p:sp>
+        <p:nvSpPr>
+          <p:cNvPr id="14" name="Textfeld 13"/>
+          <p:cNvSpPr txBox="1"/>
+          <p:nvPr/>
+        </p:nvSpPr>
+        <p:spPr>
+          <a:xfrm>
+            <a:off x="467544" y="1124744"/>
+            <a:ext cx="341760" cy="276999"/>
+          </a:xfrm>
+          <a:prstGeom prst="rect">
+            <a:avLst/>
+          </a:prstGeom>
+          <a:noFill/>
+        </p:spPr>
+        <p:txBody>
+          <a:bodyPr wrap="none" rtlCol="0">
+            <a:spAutoFit/>
+          </a:bodyPr>
+          <a:lstStyle/>
+          <a:p>
+            <a:r>
+              <a:rPr lang="de-DE" sz="1200" dirty="0" smtClean="0"/>
+              <a:t>90</a:t>
+            </a:r>
+            <a:endParaRPr lang="de-DE" sz="1200" dirty="0"/>
+          </a:p>
+        </p:txBody>
+      </p:sp>
+      <p:sp>
+        <p:nvSpPr>
+          <p:cNvPr id="15" name="Textfeld 14"/>
+          <p:cNvSpPr txBox="1"/>
+          <p:nvPr/>
+        </p:nvSpPr>
+        <p:spPr>
+          <a:xfrm>
+            <a:off x="1493936" y="6320353"/>
+            <a:ext cx="341760" cy="276999"/>
+          </a:xfrm>
+          <a:prstGeom prst="rect">
+            <a:avLst/>
+          </a:prstGeom>
+          <a:noFill/>
+        </p:spPr>
+        <p:txBody>
+          <a:bodyPr wrap="none" rtlCol="0">
+            <a:spAutoFit/>
+          </a:bodyPr>
+          <a:lstStyle/>
+          <a:p>
+            <a:r>
+              <a:rPr lang="de-DE" sz="1200" dirty="0" smtClean="0"/>
+              <a:t>10</a:t>
+            </a:r>
+            <a:endParaRPr lang="de-DE" sz="1200" dirty="0"/>
+          </a:p>
+        </p:txBody>
+      </p:sp>
+      <p:sp>
+        <p:nvSpPr>
+          <p:cNvPr id="16" name="Textfeld 15"/>
+          <p:cNvSpPr txBox="1"/>
+          <p:nvPr/>
+        </p:nvSpPr>
+        <p:spPr>
+          <a:xfrm>
+            <a:off x="2214016" y="6320353"/>
+            <a:ext cx="341760" cy="276999"/>
+          </a:xfrm>
+          <a:prstGeom prst="rect">
+            <a:avLst/>
+          </a:prstGeom>
+          <a:noFill/>
+        </p:spPr>
+        <p:txBody>
+          <a:bodyPr wrap="none" rtlCol="0">
+            <a:spAutoFit/>
+          </a:bodyPr>
+          <a:lstStyle/>
+          <a:p>
+            <a:r>
+              <a:rPr lang="de-DE" sz="1200" dirty="0" smtClean="0"/>
+              <a:t>20</a:t>
+            </a:r>
+            <a:endParaRPr lang="de-DE" sz="1200" dirty="0"/>
+          </a:p>
+        </p:txBody>
+      </p:sp>
+      <p:sp>
+        <p:nvSpPr>
+          <p:cNvPr id="17" name="Textfeld 16"/>
+          <p:cNvSpPr txBox="1"/>
+          <p:nvPr/>
+        </p:nvSpPr>
+        <p:spPr>
+          <a:xfrm>
+            <a:off x="2934096" y="6309320"/>
+            <a:ext cx="341760" cy="276999"/>
+          </a:xfrm>
+          <a:prstGeom prst="rect">
+            <a:avLst/>
+          </a:prstGeom>
+          <a:noFill/>
+        </p:spPr>
+        <p:txBody>
+          <a:bodyPr wrap="none" rtlCol="0">
+            <a:spAutoFit/>
+          </a:bodyPr>
+          <a:lstStyle/>
+          <a:p>
+            <a:r>
+              <a:rPr lang="de-DE" sz="1200" dirty="0" smtClean="0"/>
+              <a:t>30</a:t>
+            </a:r>
+            <a:endParaRPr lang="de-DE" sz="1200" dirty="0"/>
+          </a:p>
+        </p:txBody>
+      </p:sp>
+      <p:sp>
+        <p:nvSpPr>
+          <p:cNvPr id="18" name="Textfeld 17"/>
+          <p:cNvSpPr txBox="1"/>
+          <p:nvPr/>
+        </p:nvSpPr>
+        <p:spPr>
+          <a:xfrm>
+            <a:off x="3654176" y="6309320"/>
+            <a:ext cx="341760" cy="276999"/>
+          </a:xfrm>
+          <a:prstGeom prst="rect">
+            <a:avLst/>
+          </a:prstGeom>
+          <a:noFill/>
+        </p:spPr>
+        <p:txBody>
+          <a:bodyPr wrap="none" rtlCol="0">
+            <a:spAutoFit/>
+          </a:bodyPr>
+          <a:lstStyle/>
+          <a:p>
+            <a:r>
+              <a:rPr lang="de-DE" sz="1200" dirty="0" smtClean="0"/>
+              <a:t>40</a:t>
+            </a:r>
+            <a:endParaRPr lang="de-DE" sz="1200" dirty="0"/>
+          </a:p>
+        </p:txBody>
+      </p:sp>
+      <p:sp>
+        <p:nvSpPr>
+          <p:cNvPr id="19" name="Textfeld 18"/>
+          <p:cNvSpPr txBox="1"/>
+          <p:nvPr/>
+        </p:nvSpPr>
+        <p:spPr>
+          <a:xfrm>
+            <a:off x="4374256" y="6318556"/>
+            <a:ext cx="341760" cy="276999"/>
+          </a:xfrm>
+          <a:prstGeom prst="rect">
+            <a:avLst/>
+          </a:prstGeom>
+          <a:noFill/>
+        </p:spPr>
+        <p:txBody>
+          <a:bodyPr wrap="none" rtlCol="0">
+            <a:spAutoFit/>
+          </a:bodyPr>
+          <a:lstStyle/>
+          <a:p>
+            <a:r>
+              <a:rPr lang="de-DE" sz="1200" dirty="0" smtClean="0"/>
+              <a:t>50</a:t>
+            </a:r>
+            <a:endParaRPr lang="de-DE" sz="1200" dirty="0"/>
+          </a:p>
+        </p:txBody>
+      </p:sp>
+      <p:sp>
+        <p:nvSpPr>
+          <p:cNvPr id="20" name="Textfeld 19"/>
+          <p:cNvSpPr txBox="1"/>
+          <p:nvPr/>
+        </p:nvSpPr>
+        <p:spPr>
+          <a:xfrm>
+            <a:off x="5076056" y="6320353"/>
+            <a:ext cx="341760" cy="276999"/>
+          </a:xfrm>
+          <a:prstGeom prst="rect">
+            <a:avLst/>
+          </a:prstGeom>
+          <a:noFill/>
+        </p:spPr>
+        <p:txBody>
+          <a:bodyPr wrap="none" rtlCol="0">
+            <a:spAutoFit/>
+          </a:bodyPr>
+          <a:lstStyle/>
+          <a:p>
+            <a:r>
+              <a:rPr lang="de-DE" sz="1200" dirty="0" smtClean="0"/>
+              <a:t>60</a:t>
+            </a:r>
+            <a:endParaRPr lang="de-DE" sz="1200" dirty="0"/>
+          </a:p>
+        </p:txBody>
+      </p:sp>
+      <p:sp>
+        <p:nvSpPr>
+          <p:cNvPr id="21" name="Abgerundetes Rechteck 20"/>
+          <p:cNvSpPr/>
+          <p:nvPr/>
+        </p:nvSpPr>
+        <p:spPr>
+          <a:xfrm>
+            <a:off x="3642461" y="3927359"/>
+            <a:ext cx="365189" cy="432407"/>
+          </a:xfrm>
+          <a:prstGeom prst="roundRect">
+            <a:avLst/>
+          </a:prstGeom>
+          <a:solidFill>
+            <a:schemeClr val="accent1">
+              <a:lumMod val="50000"/>
+            </a:schemeClr>
+          </a:solidFill>
+        </p:spPr>
+        <p:style>
+          <a:lnRef idx="3">
+            <a:schemeClr val="lt1"/>
+          </a:lnRef>
+          <a:fillRef idx="1">
+            <a:schemeClr val="accent4"/>
+          </a:fillRef>
+          <a:effectRef idx="1">
+            <a:schemeClr val="accent4"/>
+          </a:effectRef>
+          <a:fontRef idx="minor">
+            <a:schemeClr val="lt1"/>
+          </a:fontRef>
+        </p:style>
+        <p:txBody>
+          <a:bodyPr rtlCol="0" anchor="ctr"/>
+          <a:lstStyle/>
+          <a:p>
+            <a:pPr algn="ctr"/>
+            <a:r>
+              <a:rPr lang="de-DE" dirty="0" smtClean="0"/>
+              <a:t>D</a:t>
+            </a:r>
+            <a:endParaRPr lang="de-DE" dirty="0"/>
+          </a:p>
+        </p:txBody>
+      </p:sp>
+      <p:sp>
+        <p:nvSpPr>
+          <p:cNvPr id="22" name="Ellipse 21"/>
+          <p:cNvSpPr/>
+          <p:nvPr/>
+        </p:nvSpPr>
+        <p:spPr>
+          <a:xfrm flipH="1">
+            <a:off x="6876256" y="5024209"/>
+            <a:ext cx="295210" cy="276999"/>
+          </a:xfrm>
+          <a:prstGeom prst="ellipse">
+            <a:avLst/>
+          </a:prstGeom>
+        </p:spPr>
+        <p:style>
+          <a:lnRef idx="3">
+            <a:schemeClr val="lt1"/>
+          </a:lnRef>
+          <a:fillRef idx="1">
+            <a:schemeClr val="accent1"/>
+          </a:fillRef>
+          <a:effectRef idx="1">
+            <a:schemeClr val="accent1"/>
+          </a:effectRef>
+          <a:fontRef idx="minor">
+            <a:schemeClr val="lt1"/>
+          </a:fontRef>
+        </p:style>
+        <p:txBody>
+          <a:bodyPr rtlCol="0" anchor="ctr"/>
+          <a:lstStyle/>
+          <a:p>
+            <a:pPr algn="ctr"/>
+            <a:r>
+              <a:rPr lang="de-DE" sz="800" dirty="0" smtClean="0"/>
+              <a:t>81</a:t>
+            </a:r>
+            <a:endParaRPr lang="de-DE" sz="1000" dirty="0"/>
+          </a:p>
+        </p:txBody>
+      </p:sp>
+      <p:sp>
+        <p:nvSpPr>
+          <p:cNvPr id="23" name="Ellipse 22"/>
+          <p:cNvSpPr/>
+          <p:nvPr/>
+        </p:nvSpPr>
+        <p:spPr>
+          <a:xfrm flipH="1">
+            <a:off x="4421176" y="4725144"/>
+            <a:ext cx="284543" cy="259445"/>
+          </a:xfrm>
+          <a:prstGeom prst="ellipse">
+            <a:avLst/>
+          </a:prstGeom>
+        </p:spPr>
+        <p:style>
+          <a:lnRef idx="3">
+            <a:schemeClr val="lt1"/>
+          </a:lnRef>
+          <a:fillRef idx="1">
+            <a:schemeClr val="accent1"/>
+          </a:fillRef>
+          <a:effectRef idx="1">
+            <a:schemeClr val="accent1"/>
+          </a:effectRef>
+          <a:fontRef idx="minor">
+            <a:schemeClr val="lt1"/>
+          </a:fontRef>
+        </p:style>
+        <p:txBody>
+          <a:bodyPr rtlCol="0" anchor="ctr"/>
+          <a:lstStyle/>
+          <a:p>
+            <a:pPr algn="ctr"/>
+            <a:r>
+              <a:rPr lang="de-DE" sz="800" dirty="0" smtClean="0"/>
+              <a:t>63</a:t>
+            </a:r>
+            <a:endParaRPr lang="de-DE" sz="800" dirty="0"/>
+          </a:p>
+        </p:txBody>
+      </p:sp>
+      <p:sp>
+        <p:nvSpPr>
+          <p:cNvPr id="24" name="Ellipse 23"/>
+          <p:cNvSpPr/>
+          <p:nvPr/>
+        </p:nvSpPr>
+        <p:spPr>
+          <a:xfrm flipH="1">
+            <a:off x="4427984" y="5085184"/>
+            <a:ext cx="284543" cy="259445"/>
+          </a:xfrm>
+          <a:prstGeom prst="ellipse">
+            <a:avLst/>
+          </a:prstGeom>
+        </p:spPr>
+        <p:style>
+          <a:lnRef idx="3">
+            <a:schemeClr val="lt1"/>
+          </a:lnRef>
+          <a:fillRef idx="1">
+            <a:schemeClr val="accent1"/>
+          </a:fillRef>
+          <a:effectRef idx="1">
+            <a:schemeClr val="accent1"/>
+          </a:effectRef>
+          <a:fontRef idx="minor">
+            <a:schemeClr val="lt1"/>
+          </a:fontRef>
+        </p:style>
+        <p:txBody>
+          <a:bodyPr rtlCol="0" anchor="ctr"/>
+          <a:lstStyle/>
+          <a:p>
+            <a:pPr algn="ctr"/>
+            <a:r>
+              <a:rPr lang="de-DE" sz="800" dirty="0" smtClean="0"/>
+              <a:t>62</a:t>
+            </a:r>
+            <a:endParaRPr lang="de-DE" sz="800" dirty="0"/>
+          </a:p>
+        </p:txBody>
+      </p:sp>
+      <p:sp>
+        <p:nvSpPr>
+          <p:cNvPr id="25" name="Ellipse 24"/>
+          <p:cNvSpPr/>
+          <p:nvPr/>
+        </p:nvSpPr>
+        <p:spPr>
+          <a:xfrm flipH="1">
+            <a:off x="7164288" y="5032985"/>
+            <a:ext cx="284543" cy="259445"/>
+          </a:xfrm>
+          <a:prstGeom prst="ellipse">
+            <a:avLst/>
+          </a:prstGeom>
+        </p:spPr>
+        <p:style>
+          <a:lnRef idx="3">
+            <a:schemeClr val="lt1"/>
+          </a:lnRef>
+          <a:fillRef idx="1">
+            <a:schemeClr val="accent1"/>
+          </a:fillRef>
+          <a:effectRef idx="1">
+            <a:schemeClr val="accent1"/>
+          </a:effectRef>
+          <a:fontRef idx="minor">
+            <a:schemeClr val="lt1"/>
+          </a:fontRef>
+        </p:style>
+        <p:txBody>
+          <a:bodyPr rtlCol="0" anchor="ctr"/>
+          <a:lstStyle/>
+          <a:p>
+            <a:pPr algn="ctr"/>
+            <a:r>
+              <a:rPr lang="de-DE" sz="800" dirty="0" smtClean="0"/>
+              <a:t>78</a:t>
+            </a:r>
+            <a:endParaRPr lang="de-DE" sz="800" dirty="0"/>
+          </a:p>
+        </p:txBody>
+      </p:sp>
+      <p:sp>
+        <p:nvSpPr>
+          <p:cNvPr id="26" name="Textfeld 25"/>
+          <p:cNvSpPr txBox="1"/>
+          <p:nvPr/>
+        </p:nvSpPr>
+        <p:spPr>
+          <a:xfrm>
+            <a:off x="6664925" y="4747210"/>
+            <a:ext cx="708848" cy="276999"/>
+          </a:xfrm>
+          <a:prstGeom prst="rect">
+            <a:avLst/>
+          </a:prstGeom>
+          <a:noFill/>
+        </p:spPr>
+        <p:txBody>
+          <a:bodyPr wrap="none" rtlCol="0">
+            <a:spAutoFit/>
+          </a:bodyPr>
+          <a:lstStyle/>
+          <a:p>
+            <a:r>
+              <a:rPr lang="de-DE" sz="1200" dirty="0" smtClean="0"/>
+              <a:t>[47,124]</a:t>
+            </a:r>
+            <a:endParaRPr lang="de-DE" sz="1200" dirty="0"/>
+          </a:p>
+        </p:txBody>
+      </p:sp>
+      <p:sp>
+        <p:nvSpPr>
+          <p:cNvPr id="27" name="Textfeld 26"/>
+          <p:cNvSpPr txBox="1"/>
+          <p:nvPr/>
+        </p:nvSpPr>
+        <p:spPr>
+          <a:xfrm>
+            <a:off x="4144645" y="4448145"/>
+            <a:ext cx="787395" cy="276999"/>
+          </a:xfrm>
+          <a:prstGeom prst="rect">
+            <a:avLst/>
+          </a:prstGeom>
+          <a:noFill/>
+        </p:spPr>
+        <p:txBody>
+          <a:bodyPr wrap="none" rtlCol="0">
+            <a:spAutoFit/>
+          </a:bodyPr>
+          <a:lstStyle/>
+          <a:p>
+            <a:r>
+              <a:rPr lang="de-DE" sz="1200" dirty="0" smtClean="0"/>
+              <a:t>[</a:t>
+            </a:r>
+            <a:r>
+              <a:rPr lang="de-DE" sz="1200" dirty="0" smtClean="0"/>
+              <a:t>171</a:t>
+            </a:r>
+            <a:r>
+              <a:rPr lang="de-DE" sz="1200" dirty="0" smtClean="0"/>
+              <a:t>,218]</a:t>
+            </a:r>
+            <a:endParaRPr lang="de-DE" sz="1200" dirty="0"/>
+          </a:p>
+        </p:txBody>
+      </p:sp>
+      <p:sp>
+        <p:nvSpPr>
+          <p:cNvPr id="28" name="Textfeld 27"/>
+          <p:cNvSpPr txBox="1"/>
+          <p:nvPr/>
+        </p:nvSpPr>
+        <p:spPr>
+          <a:xfrm>
+            <a:off x="4211960" y="5404209"/>
+            <a:ext cx="787395" cy="276999"/>
+          </a:xfrm>
+          <a:prstGeom prst="rect">
+            <a:avLst/>
+          </a:prstGeom>
+          <a:noFill/>
+        </p:spPr>
+        <p:txBody>
+          <a:bodyPr wrap="none" rtlCol="0">
+            <a:spAutoFit/>
+          </a:bodyPr>
+          <a:lstStyle/>
+          <a:p>
+            <a:r>
+              <a:rPr lang="de-DE" sz="1200" dirty="0" smtClean="0"/>
+              <a:t>[262,317]</a:t>
+            </a:r>
+            <a:endParaRPr lang="de-DE" sz="1200" dirty="0"/>
+          </a:p>
+        </p:txBody>
+      </p:sp>
+      <p:sp>
+        <p:nvSpPr>
+          <p:cNvPr id="29" name="Textfeld 28"/>
+          <p:cNvSpPr txBox="1"/>
+          <p:nvPr/>
+        </p:nvSpPr>
+        <p:spPr>
+          <a:xfrm>
+            <a:off x="6993385" y="5344629"/>
+            <a:ext cx="787395" cy="276999"/>
+          </a:xfrm>
+          <a:prstGeom prst="rect">
+            <a:avLst/>
+          </a:prstGeom>
+          <a:noFill/>
+        </p:spPr>
+        <p:txBody>
+          <a:bodyPr wrap="none" rtlCol="0">
+            <a:spAutoFit/>
+          </a:bodyPr>
+          <a:lstStyle/>
+          <a:p>
+            <a:r>
+              <a:rPr lang="de-DE" sz="1200" dirty="0" smtClean="0"/>
+              <a:t>[109,170]</a:t>
+            </a:r>
+            <a:endParaRPr lang="de-DE" sz="1200" dirty="0"/>
+          </a:p>
+        </p:txBody>
+      </p:sp>
+      <p:sp>
+        <p:nvSpPr>
+          <p:cNvPr id="30" name="Textfeld 29"/>
+          <p:cNvSpPr txBox="1"/>
+          <p:nvPr/>
+        </p:nvSpPr>
+        <p:spPr>
+          <a:xfrm>
+            <a:off x="6300192" y="764704"/>
+            <a:ext cx="2026517" cy="1200329"/>
+          </a:xfrm>
+          <a:prstGeom prst="rect">
+            <a:avLst/>
+          </a:prstGeom>
+          <a:noFill/>
+        </p:spPr>
+        <p:txBody>
+          <a:bodyPr wrap="none" rtlCol="0">
+            <a:spAutoFit/>
+          </a:bodyPr>
+          <a:lstStyle/>
+          <a:p>
+            <a:r>
+              <a:rPr lang="de-DE" dirty="0" smtClean="0"/>
+              <a:t>Distanzen:</a:t>
+            </a:r>
+          </a:p>
+          <a:p>
+            <a:r>
+              <a:rPr lang="de-DE" dirty="0" smtClean="0"/>
+              <a:t>t(78,63) </a:t>
+            </a:r>
+            <a:r>
+              <a:rPr lang="de-DE" dirty="0" smtClean="0"/>
+              <a:t>= </a:t>
+            </a:r>
+            <a:r>
+              <a:rPr lang="de-DE" dirty="0" smtClean="0"/>
+              <a:t>38,32754</a:t>
+            </a:r>
+            <a:endParaRPr lang="de-DE" dirty="0" smtClean="0"/>
+          </a:p>
+          <a:p>
+            <a:endParaRPr lang="de-DE" dirty="0"/>
+          </a:p>
+          <a:p>
+            <a:r>
+              <a:rPr lang="de-DE" dirty="0" smtClean="0"/>
+              <a:t>Service Times: 90</a:t>
+            </a:r>
+            <a:endParaRPr lang="de-DE" dirty="0"/>
+          </a:p>
+        </p:txBody>
+      </p:sp>
+      <p:sp>
+        <p:nvSpPr>
+          <p:cNvPr id="31" name="Textfeld 19"/>
+          <p:cNvSpPr txBox="1"/>
+          <p:nvPr/>
+        </p:nvSpPr>
+        <p:spPr>
+          <a:xfrm>
+            <a:off x="5742408" y="6309320"/>
+            <a:ext cx="341760" cy="276999"/>
+          </a:xfrm>
+          <a:prstGeom prst="rect">
+            <a:avLst/>
+          </a:prstGeom>
+          <a:noFill/>
+        </p:spPr>
+        <p:txBody>
+          <a:bodyPr wrap="none" rtlCol="0">
+            <a:spAutoFit/>
+          </a:bodyPr>
+          <a:lstStyle/>
+          <a:p>
+            <a:r>
+              <a:rPr lang="de-DE" sz="1200" dirty="0"/>
+              <a:t>7</a:t>
+            </a:r>
+            <a:r>
+              <a:rPr lang="de-DE" sz="1200" dirty="0" smtClean="0"/>
+              <a:t>0</a:t>
+            </a:r>
+            <a:endParaRPr lang="de-DE" sz="1200" dirty="0"/>
+          </a:p>
+        </p:txBody>
+      </p:sp>
+      <p:sp>
+        <p:nvSpPr>
+          <p:cNvPr id="32" name="Textfeld 19"/>
+          <p:cNvSpPr txBox="1"/>
+          <p:nvPr/>
+        </p:nvSpPr>
+        <p:spPr>
+          <a:xfrm>
+            <a:off x="6462488" y="6320353"/>
+            <a:ext cx="341760" cy="276999"/>
+          </a:xfrm>
+          <a:prstGeom prst="rect">
+            <a:avLst/>
+          </a:prstGeom>
+          <a:noFill/>
+        </p:spPr>
+        <p:txBody>
+          <a:bodyPr wrap="none" rtlCol="0">
+            <a:spAutoFit/>
+          </a:bodyPr>
+          <a:lstStyle/>
+          <a:p>
+            <a:r>
+              <a:rPr lang="de-DE" sz="1200" dirty="0" smtClean="0"/>
+              <a:t>80</a:t>
+            </a:r>
+            <a:endParaRPr lang="de-DE" sz="1200" dirty="0"/>
+          </a:p>
+        </p:txBody>
+      </p:sp>
+      <p:sp>
+        <p:nvSpPr>
+          <p:cNvPr id="33" name="Textfeld 19"/>
+          <p:cNvSpPr txBox="1"/>
+          <p:nvPr/>
+        </p:nvSpPr>
+        <p:spPr>
+          <a:xfrm>
+            <a:off x="7236296" y="6309320"/>
+            <a:ext cx="341760" cy="276999"/>
+          </a:xfrm>
+          <a:prstGeom prst="rect">
+            <a:avLst/>
+          </a:prstGeom>
+          <a:noFill/>
+        </p:spPr>
+        <p:txBody>
+          <a:bodyPr wrap="none" rtlCol="0">
+            <a:spAutoFit/>
+          </a:bodyPr>
+          <a:lstStyle/>
+          <a:p>
+            <a:r>
+              <a:rPr lang="de-DE" sz="1200" dirty="0" smtClean="0"/>
+              <a:t>90</a:t>
+            </a:r>
+            <a:endParaRPr lang="de-DE" sz="1200" dirty="0"/>
+          </a:p>
+        </p:txBody>
+      </p:sp>
+      <p:sp>
+        <p:nvSpPr>
+          <p:cNvPr id="34" name="Ellipse 23"/>
+          <p:cNvSpPr/>
+          <p:nvPr/>
+        </p:nvSpPr>
+        <p:spPr>
+          <a:xfrm flipH="1">
+            <a:off x="4716016" y="5086061"/>
+            <a:ext cx="284543" cy="259445"/>
+          </a:xfrm>
+          <a:prstGeom prst="ellipse">
+            <a:avLst/>
+          </a:prstGeom>
+        </p:spPr>
+        <p:style>
+          <a:lnRef idx="3">
+            <a:schemeClr val="lt1"/>
+          </a:lnRef>
+          <a:fillRef idx="1">
+            <a:schemeClr val="accent1"/>
+          </a:fillRef>
+          <a:effectRef idx="1">
+            <a:schemeClr val="accent1"/>
+          </a:effectRef>
+          <a:fontRef idx="minor">
+            <a:schemeClr val="lt1"/>
+          </a:fontRef>
+        </p:style>
+        <p:txBody>
+          <a:bodyPr rtlCol="0" anchor="ctr"/>
+          <a:lstStyle/>
+          <a:p>
+            <a:pPr algn="ctr"/>
+            <a:r>
+              <a:rPr lang="de-DE" sz="800" dirty="0" smtClean="0"/>
+              <a:t>74</a:t>
+            </a:r>
+            <a:endParaRPr lang="de-DE" sz="800" dirty="0"/>
+          </a:p>
+        </p:txBody>
+      </p:sp>
+      <p:sp>
+        <p:nvSpPr>
+          <p:cNvPr id="35" name="Textfeld 27"/>
+          <p:cNvSpPr txBox="1"/>
+          <p:nvPr/>
+        </p:nvSpPr>
+        <p:spPr>
+          <a:xfrm>
+            <a:off x="4864725" y="5301208"/>
+            <a:ext cx="787395" cy="276999"/>
+          </a:xfrm>
+          <a:prstGeom prst="rect">
+            <a:avLst/>
+          </a:prstGeom>
+          <a:noFill/>
+        </p:spPr>
+        <p:txBody>
+          <a:bodyPr wrap="none" rtlCol="0">
+            <a:spAutoFit/>
+          </a:bodyPr>
+          <a:lstStyle/>
+          <a:p>
+            <a:r>
+              <a:rPr lang="de-DE" sz="1200" dirty="0" smtClean="0"/>
+              <a:t>[353,412]</a:t>
+            </a:r>
+            <a:endParaRPr lang="de-DE" sz="1200" dirty="0"/>
+          </a:p>
+        </p:txBody>
+      </p:sp>
+      <p:sp>
+        <p:nvSpPr>
+          <p:cNvPr id="36" name="Ellipse 23"/>
+          <p:cNvSpPr/>
+          <p:nvPr/>
+        </p:nvSpPr>
+        <p:spPr>
+          <a:xfrm flipH="1">
+            <a:off x="4139952" y="5085184"/>
+            <a:ext cx="284543" cy="259445"/>
+          </a:xfrm>
+          <a:prstGeom prst="ellipse">
+            <a:avLst/>
+          </a:prstGeom>
+        </p:spPr>
+        <p:style>
+          <a:lnRef idx="3">
+            <a:schemeClr val="lt1"/>
+          </a:lnRef>
+          <a:fillRef idx="1">
+            <a:schemeClr val="accent1"/>
+          </a:fillRef>
+          <a:effectRef idx="1">
+            <a:schemeClr val="accent1"/>
+          </a:effectRef>
+          <a:fontRef idx="minor">
+            <a:schemeClr val="lt1"/>
+          </a:fontRef>
+        </p:style>
+        <p:txBody>
+          <a:bodyPr rtlCol="0" anchor="ctr"/>
+          <a:lstStyle/>
+          <a:p>
+            <a:pPr algn="ctr"/>
+            <a:r>
+              <a:rPr lang="de-DE" sz="800" dirty="0" smtClean="0"/>
+              <a:t>66</a:t>
+            </a:r>
+            <a:endParaRPr lang="de-DE" sz="800" dirty="0"/>
+          </a:p>
+        </p:txBody>
+      </p:sp>
+      <p:sp>
+        <p:nvSpPr>
+          <p:cNvPr id="37" name="Textfeld 27"/>
+          <p:cNvSpPr txBox="1"/>
+          <p:nvPr/>
+        </p:nvSpPr>
+        <p:spPr>
+          <a:xfrm>
+            <a:off x="3927268" y="5594756"/>
+            <a:ext cx="787395" cy="276999"/>
+          </a:xfrm>
+          <a:prstGeom prst="rect">
+            <a:avLst/>
+          </a:prstGeom>
+          <a:noFill/>
+        </p:spPr>
+        <p:txBody>
+          <a:bodyPr wrap="none" rtlCol="0">
+            <a:spAutoFit/>
+          </a:bodyPr>
+          <a:lstStyle/>
+          <a:p>
+            <a:r>
+              <a:rPr lang="de-DE" sz="1200" dirty="0" smtClean="0"/>
+              <a:t>[826,875]</a:t>
+            </a:r>
+            <a:endParaRPr lang="de-DE" sz="1200" dirty="0"/>
+          </a:p>
+        </p:txBody>
+      </p:sp>
+      <p:sp>
+        <p:nvSpPr>
+          <p:cNvPr id="38" name="Ellipse 23"/>
+          <p:cNvSpPr/>
+          <p:nvPr/>
+        </p:nvSpPr>
+        <p:spPr>
+          <a:xfrm flipH="1">
+            <a:off x="3851920" y="5085184"/>
+            <a:ext cx="284543" cy="259445"/>
+          </a:xfrm>
+          <a:prstGeom prst="ellipse">
+            <a:avLst/>
+          </a:prstGeom>
+        </p:spPr>
+        <p:style>
+          <a:lnRef idx="3">
+            <a:schemeClr val="lt1"/>
+          </a:lnRef>
+          <a:fillRef idx="1">
+            <a:schemeClr val="accent1"/>
+          </a:fillRef>
+          <a:effectRef idx="1">
+            <a:schemeClr val="accent1"/>
+          </a:effectRef>
+          <a:fontRef idx="minor">
+            <a:schemeClr val="lt1"/>
+          </a:fontRef>
+        </p:style>
+        <p:txBody>
+          <a:bodyPr rtlCol="0" anchor="ctr"/>
+          <a:lstStyle/>
+          <a:p>
+            <a:pPr algn="ctr"/>
+            <a:r>
+              <a:rPr lang="de-DE" sz="800" dirty="0" smtClean="0"/>
+              <a:t>69</a:t>
+            </a:r>
+            <a:endParaRPr lang="de-DE" sz="800" dirty="0"/>
+          </a:p>
+        </p:txBody>
+      </p:sp>
+      <p:sp>
+        <p:nvSpPr>
+          <p:cNvPr id="39" name="Textfeld 27"/>
+          <p:cNvSpPr txBox="1"/>
+          <p:nvPr/>
+        </p:nvSpPr>
+        <p:spPr>
+          <a:xfrm>
+            <a:off x="3491880" y="5400926"/>
+            <a:ext cx="787395" cy="276999"/>
+          </a:xfrm>
+          <a:prstGeom prst="rect">
+            <a:avLst/>
+          </a:prstGeom>
+          <a:noFill/>
+        </p:spPr>
+        <p:txBody>
+          <a:bodyPr wrap="none" rtlCol="0">
+            <a:spAutoFit/>
+          </a:bodyPr>
+          <a:lstStyle/>
+          <a:p>
+            <a:r>
+              <a:rPr lang="de-DE" sz="1200" dirty="0" smtClean="0"/>
+              <a:t>[916,969]</a:t>
+            </a:r>
+            <a:endParaRPr lang="de-DE" sz="1200" dirty="0"/>
+          </a:p>
+        </p:txBody>
+      </p:sp>
+      <p:sp>
+        <p:nvSpPr>
+          <p:cNvPr id="40" name="Ellipse 23"/>
+          <p:cNvSpPr/>
+          <p:nvPr/>
+        </p:nvSpPr>
+        <p:spPr>
+          <a:xfrm flipH="1">
+            <a:off x="2987824" y="5085184"/>
+            <a:ext cx="284543" cy="259445"/>
+          </a:xfrm>
+          <a:prstGeom prst="ellipse">
+            <a:avLst/>
+          </a:prstGeom>
+        </p:spPr>
+        <p:style>
+          <a:lnRef idx="3">
+            <a:schemeClr val="lt1"/>
+          </a:lnRef>
+          <a:fillRef idx="1">
+            <a:schemeClr val="accent1"/>
+          </a:fillRef>
+          <a:effectRef idx="1">
+            <a:schemeClr val="accent1"/>
+          </a:effectRef>
+          <a:fontRef idx="minor">
+            <a:schemeClr val="lt1"/>
+          </a:fontRef>
+        </p:style>
+        <p:txBody>
+          <a:bodyPr rtlCol="0" anchor="ctr"/>
+          <a:lstStyle/>
+          <a:p>
+            <a:pPr algn="ctr"/>
+            <a:r>
+              <a:rPr lang="de-DE" sz="800" dirty="0" smtClean="0"/>
+              <a:t>47</a:t>
+            </a:r>
+            <a:endParaRPr lang="de-DE" sz="800" dirty="0"/>
+          </a:p>
+        </p:txBody>
+      </p:sp>
+      <p:sp>
+        <p:nvSpPr>
+          <p:cNvPr id="41" name="Textfeld 27"/>
+          <p:cNvSpPr txBox="1"/>
+          <p:nvPr/>
+        </p:nvSpPr>
+        <p:spPr>
+          <a:xfrm>
+            <a:off x="2691407" y="5400926"/>
+            <a:ext cx="944489" cy="276999"/>
+          </a:xfrm>
+          <a:prstGeom prst="rect">
+            <a:avLst/>
+          </a:prstGeom>
+          <a:noFill/>
+        </p:spPr>
+        <p:txBody>
+          <a:bodyPr wrap="none" rtlCol="0">
+            <a:spAutoFit/>
+          </a:bodyPr>
+          <a:lstStyle/>
+          <a:p>
+            <a:r>
+              <a:rPr lang="de-DE" sz="1200" dirty="0" smtClean="0"/>
+              <a:t>[1054,1127]</a:t>
+            </a:r>
+            <a:endParaRPr lang="de-DE" sz="1200" dirty="0"/>
+          </a:p>
+        </p:txBody>
+      </p:sp>
+    </p:spTree>
+    <p:extLst>
+      <p:ext uri="{BB962C8B-B14F-4D97-AF65-F5344CB8AC3E}">
+        <p14:creationId xmlns:p14="http://schemas.microsoft.com/office/powerpoint/2010/main" val="1964457895"/>
+      </p:ext>
+    </p:extLst>
+  </p:cSld>
+  <p:clrMapOvr>
+    <a:masterClrMapping/>
+  </p:clrMapOvr>
+  <p:timing>
+    <p:tnLst>
+      <p:par>
+        <p:cTn id="1" dur="indefinite" restart="never" nodeType="tmRoot"/>
+      </p:par>
+    </p:tnLst>
+  </p:timing>
 </p:sld>
 </file>
 

</xml_diff>